<commit_message>
updated logo and website
</commit_message>
<xml_diff>
--- a/inst/logos/logo.pptx
+++ b/inst/logos/logo.pptx
@@ -8,6 +8,7 @@
     <p:sldId id="256" r:id="rId2"/>
     <p:sldId id="257" r:id="rId3"/>
     <p:sldId id="258" r:id="rId4"/>
+    <p:sldId id="259" r:id="rId5"/>
   </p:sldIdLst>
   <p:sldSz cx="12192000" cy="6858000"/>
   <p:notesSz cx="6858000" cy="9144000"/>
@@ -261,7 +262,7 @@
           <a:p>
             <a:fld id="{312C818C-9663-4356-B8C4-1E4947C4110C}" type="datetimeFigureOut">
               <a:rPr lang="de-DE" smtClean="0"/>
-              <a:t>17.10.2023</a:t>
+              <a:t>29.04.2025</a:t>
             </a:fld>
             <a:endParaRPr lang="de-DE"/>
           </a:p>
@@ -459,7 +460,7 @@
           <a:p>
             <a:fld id="{312C818C-9663-4356-B8C4-1E4947C4110C}" type="datetimeFigureOut">
               <a:rPr lang="de-DE" smtClean="0"/>
-              <a:t>17.10.2023</a:t>
+              <a:t>29.04.2025</a:t>
             </a:fld>
             <a:endParaRPr lang="de-DE"/>
           </a:p>
@@ -667,7 +668,7 @@
           <a:p>
             <a:fld id="{312C818C-9663-4356-B8C4-1E4947C4110C}" type="datetimeFigureOut">
               <a:rPr lang="de-DE" smtClean="0"/>
-              <a:t>17.10.2023</a:t>
+              <a:t>29.04.2025</a:t>
             </a:fld>
             <a:endParaRPr lang="de-DE"/>
           </a:p>
@@ -865,7 +866,7 @@
           <a:p>
             <a:fld id="{312C818C-9663-4356-B8C4-1E4947C4110C}" type="datetimeFigureOut">
               <a:rPr lang="de-DE" smtClean="0"/>
-              <a:t>17.10.2023</a:t>
+              <a:t>29.04.2025</a:t>
             </a:fld>
             <a:endParaRPr lang="de-DE"/>
           </a:p>
@@ -1140,7 +1141,7 @@
           <a:p>
             <a:fld id="{312C818C-9663-4356-B8C4-1E4947C4110C}" type="datetimeFigureOut">
               <a:rPr lang="de-DE" smtClean="0"/>
-              <a:t>17.10.2023</a:t>
+              <a:t>29.04.2025</a:t>
             </a:fld>
             <a:endParaRPr lang="de-DE"/>
           </a:p>
@@ -1405,7 +1406,7 @@
           <a:p>
             <a:fld id="{312C818C-9663-4356-B8C4-1E4947C4110C}" type="datetimeFigureOut">
               <a:rPr lang="de-DE" smtClean="0"/>
-              <a:t>17.10.2023</a:t>
+              <a:t>29.04.2025</a:t>
             </a:fld>
             <a:endParaRPr lang="de-DE"/>
           </a:p>
@@ -1817,7 +1818,7 @@
           <a:p>
             <a:fld id="{312C818C-9663-4356-B8C4-1E4947C4110C}" type="datetimeFigureOut">
               <a:rPr lang="de-DE" smtClean="0"/>
-              <a:t>17.10.2023</a:t>
+              <a:t>29.04.2025</a:t>
             </a:fld>
             <a:endParaRPr lang="de-DE"/>
           </a:p>
@@ -1958,7 +1959,7 @@
           <a:p>
             <a:fld id="{312C818C-9663-4356-B8C4-1E4947C4110C}" type="datetimeFigureOut">
               <a:rPr lang="de-DE" smtClean="0"/>
-              <a:t>17.10.2023</a:t>
+              <a:t>29.04.2025</a:t>
             </a:fld>
             <a:endParaRPr lang="de-DE"/>
           </a:p>
@@ -2071,7 +2072,7 @@
           <a:p>
             <a:fld id="{312C818C-9663-4356-B8C4-1E4947C4110C}" type="datetimeFigureOut">
               <a:rPr lang="de-DE" smtClean="0"/>
-              <a:t>17.10.2023</a:t>
+              <a:t>29.04.2025</a:t>
             </a:fld>
             <a:endParaRPr lang="de-DE"/>
           </a:p>
@@ -2382,7 +2383,7 @@
           <a:p>
             <a:fld id="{312C818C-9663-4356-B8C4-1E4947C4110C}" type="datetimeFigureOut">
               <a:rPr lang="de-DE" smtClean="0"/>
-              <a:t>17.10.2023</a:t>
+              <a:t>29.04.2025</a:t>
             </a:fld>
             <a:endParaRPr lang="de-DE"/>
           </a:p>
@@ -2670,7 +2671,7 @@
           <a:p>
             <a:fld id="{312C818C-9663-4356-B8C4-1E4947C4110C}" type="datetimeFigureOut">
               <a:rPr lang="de-DE" smtClean="0"/>
-              <a:t>17.10.2023</a:t>
+              <a:t>29.04.2025</a:t>
             </a:fld>
             <a:endParaRPr lang="de-DE"/>
           </a:p>
@@ -2911,7 +2912,7 @@
           <a:p>
             <a:fld id="{312C818C-9663-4356-B8C4-1E4947C4110C}" type="datetimeFigureOut">
               <a:rPr lang="de-DE" smtClean="0"/>
-              <a:t>17.10.2023</a:t>
+              <a:t>29.04.2025</a:t>
             </a:fld>
             <a:endParaRPr lang="de-DE"/>
           </a:p>
@@ -3516,6 +3517,78 @@
           </a:prstGeom>
         </p:spPr>
       </p:pic>
+      <p:pic>
+        <p:nvPicPr>
+          <p:cNvPr id="3" name="Grafik 2">
+            <a:extLst>
+              <a:ext uri="{FF2B5EF4-FFF2-40B4-BE49-F238E27FC236}">
+                <a16:creationId xmlns:a16="http://schemas.microsoft.com/office/drawing/2014/main" id="{D06EC111-1D95-5F59-56F3-3B7F1D0E2CC2}"/>
+              </a:ext>
+            </a:extLst>
+          </p:cNvPr>
+          <p:cNvPicPr>
+            <a:picLocks noChangeAspect="1"/>
+          </p:cNvPicPr>
+          <p:nvPr/>
+        </p:nvPicPr>
+        <p:blipFill>
+          <a:blip r:embed="rId7">
+            <a:extLst>
+              <a:ext uri="{28A0092B-C50C-407E-A947-70E740481C1C}">
+                <a14:useLocalDpi xmlns:a14="http://schemas.microsoft.com/office/drawing/2010/main" val="0"/>
+              </a:ext>
+            </a:extLst>
+          </a:blip>
+          <a:stretch>
+            <a:fillRect/>
+          </a:stretch>
+        </p:blipFill>
+        <p:spPr>
+          <a:xfrm>
+            <a:off x="8735634" y="4615263"/>
+            <a:ext cx="3599688" cy="2161032"/>
+          </a:xfrm>
+          <a:prstGeom prst="rect">
+            <a:avLst/>
+          </a:prstGeom>
+        </p:spPr>
+      </p:pic>
+      <p:pic>
+        <p:nvPicPr>
+          <p:cNvPr id="6" name="Grafik 5">
+            <a:extLst>
+              <a:ext uri="{FF2B5EF4-FFF2-40B4-BE49-F238E27FC236}">
+                <a16:creationId xmlns:a16="http://schemas.microsoft.com/office/drawing/2014/main" id="{876CEE9B-0436-A418-3F41-34C4E7EA8270}"/>
+              </a:ext>
+            </a:extLst>
+          </p:cNvPr>
+          <p:cNvPicPr>
+            <a:picLocks noChangeAspect="1"/>
+          </p:cNvPicPr>
+          <p:nvPr/>
+        </p:nvPicPr>
+        <p:blipFill>
+          <a:blip r:embed="rId8">
+            <a:extLst>
+              <a:ext uri="{28A0092B-C50C-407E-A947-70E740481C1C}">
+                <a14:useLocalDpi xmlns:a14="http://schemas.microsoft.com/office/drawing/2010/main" val="0"/>
+              </a:ext>
+            </a:extLst>
+          </a:blip>
+          <a:stretch>
+            <a:fillRect/>
+          </a:stretch>
+        </p:blipFill>
+        <p:spPr>
+          <a:xfrm>
+            <a:off x="5023650" y="4333785"/>
+            <a:ext cx="3602438" cy="2157806"/>
+          </a:xfrm>
+          <a:prstGeom prst="rect">
+            <a:avLst/>
+          </a:prstGeom>
+        </p:spPr>
+      </p:pic>
     </p:spTree>
     <p:extLst>
       <p:ext uri="{BB962C8B-B14F-4D97-AF65-F5344CB8AC3E}">
@@ -3756,12 +3829,120 @@
           <a:chExt cx="0" cy="0"/>
         </a:xfrm>
       </p:grpSpPr>
+      <p:pic>
+        <p:nvPicPr>
+          <p:cNvPr id="5" name="Grafik 4" descr="Ein Bild, das Schwarz, Dunkelheit enthält.&#10;&#10;Automatisch generierte Beschreibung">
+            <a:extLst>
+              <a:ext uri="{FF2B5EF4-FFF2-40B4-BE49-F238E27FC236}">
+                <a16:creationId xmlns:a16="http://schemas.microsoft.com/office/drawing/2014/main" id="{50EF2F3D-7713-8A7F-5905-C51E97D97016}"/>
+              </a:ext>
+            </a:extLst>
+          </p:cNvPr>
+          <p:cNvPicPr>
+            <a:picLocks noChangeAspect="1"/>
+          </p:cNvPicPr>
+          <p:nvPr/>
+        </p:nvPicPr>
+        <p:blipFill>
+          <a:blip r:embed="rId2">
+            <a:extLst>
+              <a:ext uri="{28A0092B-C50C-407E-A947-70E740481C1C}">
+                <a14:useLocalDpi xmlns:a14="http://schemas.microsoft.com/office/drawing/2010/main" val="0"/>
+              </a:ext>
+            </a:extLst>
+          </a:blip>
+          <a:stretch>
+            <a:fillRect/>
+          </a:stretch>
+        </p:blipFill>
+        <p:spPr>
+          <a:xfrm>
+            <a:off x="6132792" y="732173"/>
+            <a:ext cx="2783904" cy="1220969"/>
+          </a:xfrm>
+          <a:prstGeom prst="rect">
+            <a:avLst/>
+          </a:prstGeom>
+        </p:spPr>
+      </p:pic>
+      <p:pic>
+        <p:nvPicPr>
+          <p:cNvPr id="7" name="Grafik 6" descr="Ein Bild, das Text, Menschliches Gesicht, Schrift, Grafiken enthält.&#10;&#10;Automatisch generierte Beschreibung">
+            <a:extLst>
+              <a:ext uri="{FF2B5EF4-FFF2-40B4-BE49-F238E27FC236}">
+                <a16:creationId xmlns:a16="http://schemas.microsoft.com/office/drawing/2014/main" id="{54F34D19-C5FA-88D0-E714-EAA577B71A1A}"/>
+              </a:ext>
+            </a:extLst>
+          </p:cNvPr>
+          <p:cNvPicPr>
+            <a:picLocks noChangeAspect="1"/>
+          </p:cNvPicPr>
+          <p:nvPr/>
+        </p:nvPicPr>
+        <p:blipFill>
+          <a:blip r:embed="rId3">
+            <a:extLst>
+              <a:ext uri="{28A0092B-C50C-407E-A947-70E740481C1C}">
+                <a14:useLocalDpi xmlns:a14="http://schemas.microsoft.com/office/drawing/2010/main" val="0"/>
+              </a:ext>
+            </a:extLst>
+          </a:blip>
+          <a:stretch>
+            <a:fillRect/>
+          </a:stretch>
+        </p:blipFill>
+        <p:spPr>
+          <a:xfrm>
+            <a:off x="4302166" y="732173"/>
+            <a:ext cx="1793834" cy="977566"/>
+          </a:xfrm>
+          <a:prstGeom prst="rect">
+            <a:avLst/>
+          </a:prstGeom>
+        </p:spPr>
+      </p:pic>
+      <p:pic>
+        <p:nvPicPr>
+          <p:cNvPr id="11" name="Grafik 10" descr="Ein Bild, das Text, Schrift, Screenshot, Grafiken enthält.&#10;&#10;Automatisch generierte Beschreibung">
+            <a:extLst>
+              <a:ext uri="{FF2B5EF4-FFF2-40B4-BE49-F238E27FC236}">
+                <a16:creationId xmlns:a16="http://schemas.microsoft.com/office/drawing/2014/main" id="{A3DBA06C-FDD0-540D-4CE7-7EE310FE90FC}"/>
+              </a:ext>
+            </a:extLst>
+          </p:cNvPr>
+          <p:cNvPicPr>
+            <a:picLocks noChangeAspect="1"/>
+          </p:cNvPicPr>
+          <p:nvPr/>
+        </p:nvPicPr>
+        <p:blipFill>
+          <a:blip r:embed="rId4">
+            <a:extLst>
+              <a:ext uri="{28A0092B-C50C-407E-A947-70E740481C1C}">
+                <a14:useLocalDpi xmlns:a14="http://schemas.microsoft.com/office/drawing/2010/main" val="0"/>
+              </a:ext>
+            </a:extLst>
+          </a:blip>
+          <a:stretch>
+            <a:fillRect/>
+          </a:stretch>
+        </p:blipFill>
+        <p:spPr>
+          <a:xfrm>
+            <a:off x="8715578" y="504483"/>
+            <a:ext cx="2547457" cy="1432945"/>
+          </a:xfrm>
+          <a:prstGeom prst="rect">
+            <a:avLst/>
+          </a:prstGeom>
+        </p:spPr>
+      </p:pic>
       <p:grpSp>
         <p:nvGrpSpPr>
-          <p:cNvPr id="2" name="Gruppieren 1">
-            <a:extLst>
-              <a:ext uri="{FF2B5EF4-FFF2-40B4-BE49-F238E27FC236}">
-                <a16:creationId xmlns:a16="http://schemas.microsoft.com/office/drawing/2014/main" id="{CB199698-58D2-A34B-AD67-302429D4864F}"/>
+          <p:cNvPr id="3" name="Gruppieren 2">
+            <a:extLst>
+              <a:ext uri="{FF2B5EF4-FFF2-40B4-BE49-F238E27FC236}">
+                <a16:creationId xmlns:a16="http://schemas.microsoft.com/office/drawing/2014/main" id="{2E1C92E7-7A1A-4C9C-9D9A-5FDF4B9D850B}"/>
               </a:ext>
             </a:extLst>
           </p:cNvPr>
@@ -3770,136 +3951,7 @@
         </p:nvGrpSpPr>
         <p:grpSpPr>
           <a:xfrm>
-            <a:off x="2008194" y="1926915"/>
-            <a:ext cx="7356573" cy="1432945"/>
-            <a:chOff x="342427" y="2444366"/>
-            <a:chExt cx="7356573" cy="1432945"/>
-          </a:xfrm>
-        </p:grpSpPr>
-        <p:pic>
-          <p:nvPicPr>
-            <p:cNvPr id="5" name="Grafik 4" descr="Ein Bild, das Schwarz, Dunkelheit enthält.&#10;&#10;Automatisch generierte Beschreibung">
-              <a:extLst>
-                <a:ext uri="{FF2B5EF4-FFF2-40B4-BE49-F238E27FC236}">
-                  <a16:creationId xmlns:a16="http://schemas.microsoft.com/office/drawing/2014/main" id="{50EF2F3D-7713-8A7F-5905-C51E97D97016}"/>
-                </a:ext>
-              </a:extLst>
-            </p:cNvPr>
-            <p:cNvPicPr>
-              <a:picLocks noChangeAspect="1"/>
-            </p:cNvPicPr>
-            <p:nvPr/>
-          </p:nvPicPr>
-          <p:blipFill>
-            <a:blip r:embed="rId2">
-              <a:extLst>
-                <a:ext uri="{28A0092B-C50C-407E-A947-70E740481C1C}">
-                  <a14:useLocalDpi xmlns:a14="http://schemas.microsoft.com/office/drawing/2010/main" val="0"/>
-                </a:ext>
-              </a:extLst>
-            </a:blip>
-            <a:stretch>
-              <a:fillRect/>
-            </a:stretch>
-          </p:blipFill>
-          <p:spPr>
-            <a:xfrm>
-              <a:off x="4915096" y="2444366"/>
-              <a:ext cx="2783904" cy="1220969"/>
-            </a:xfrm>
-            <a:prstGeom prst="rect">
-              <a:avLst/>
-            </a:prstGeom>
-          </p:spPr>
-        </p:pic>
-        <p:pic>
-          <p:nvPicPr>
-            <p:cNvPr id="7" name="Grafik 6" descr="Ein Bild, das Text, Menschliches Gesicht, Schrift, Grafiken enthält.&#10;&#10;Automatisch generierte Beschreibung">
-              <a:extLst>
-                <a:ext uri="{FF2B5EF4-FFF2-40B4-BE49-F238E27FC236}">
-                  <a16:creationId xmlns:a16="http://schemas.microsoft.com/office/drawing/2014/main" id="{54F34D19-C5FA-88D0-E714-EAA577B71A1A}"/>
-                </a:ext>
-              </a:extLst>
-            </p:cNvPr>
-            <p:cNvPicPr>
-              <a:picLocks noChangeAspect="1"/>
-            </p:cNvPicPr>
-            <p:nvPr/>
-          </p:nvPicPr>
-          <p:blipFill>
-            <a:blip r:embed="rId3">
-              <a:extLst>
-                <a:ext uri="{28A0092B-C50C-407E-A947-70E740481C1C}">
-                  <a14:useLocalDpi xmlns:a14="http://schemas.microsoft.com/office/drawing/2010/main" val="0"/>
-                </a:ext>
-              </a:extLst>
-            </a:blip>
-            <a:stretch>
-              <a:fillRect/>
-            </a:stretch>
-          </p:blipFill>
-          <p:spPr>
-            <a:xfrm>
-              <a:off x="3005573" y="2492213"/>
-              <a:ext cx="1793834" cy="977566"/>
-            </a:xfrm>
-            <a:prstGeom prst="rect">
-              <a:avLst/>
-            </a:prstGeom>
-          </p:spPr>
-        </p:pic>
-        <p:pic>
-          <p:nvPicPr>
-            <p:cNvPr id="11" name="Grafik 10" descr="Ein Bild, das Text, Schrift, Screenshot, Grafiken enthält.&#10;&#10;Automatisch generierte Beschreibung">
-              <a:extLst>
-                <a:ext uri="{FF2B5EF4-FFF2-40B4-BE49-F238E27FC236}">
-                  <a16:creationId xmlns:a16="http://schemas.microsoft.com/office/drawing/2014/main" id="{A3DBA06C-FDD0-540D-4CE7-7EE310FE90FC}"/>
-                </a:ext>
-              </a:extLst>
-            </p:cNvPr>
-            <p:cNvPicPr>
-              <a:picLocks noChangeAspect="1"/>
-            </p:cNvPicPr>
-            <p:nvPr/>
-          </p:nvPicPr>
-          <p:blipFill>
-            <a:blip r:embed="rId4">
-              <a:extLst>
-                <a:ext uri="{28A0092B-C50C-407E-A947-70E740481C1C}">
-                  <a14:useLocalDpi xmlns:a14="http://schemas.microsoft.com/office/drawing/2010/main" val="0"/>
-                </a:ext>
-              </a:extLst>
-            </a:blip>
-            <a:stretch>
-              <a:fillRect/>
-            </a:stretch>
-          </p:blipFill>
-          <p:spPr>
-            <a:xfrm>
-              <a:off x="342427" y="2444366"/>
-              <a:ext cx="2547457" cy="1432945"/>
-            </a:xfrm>
-            <a:prstGeom prst="rect">
-              <a:avLst/>
-            </a:prstGeom>
-          </p:spPr>
-        </p:pic>
-      </p:grpSp>
-      <p:grpSp>
-        <p:nvGrpSpPr>
-          <p:cNvPr id="3" name="Gruppieren 2">
-            <a:extLst>
-              <a:ext uri="{FF2B5EF4-FFF2-40B4-BE49-F238E27FC236}">
-                <a16:creationId xmlns:a16="http://schemas.microsoft.com/office/drawing/2014/main" id="{2E1C92E7-7A1A-4C9C-9D9A-5FDF4B9D850B}"/>
-              </a:ext>
-            </a:extLst>
-          </p:cNvPr>
-          <p:cNvGrpSpPr/>
-          <p:nvPr/>
-        </p:nvGrpSpPr>
-        <p:grpSpPr>
-          <a:xfrm>
-            <a:off x="3558166" y="4030910"/>
+            <a:off x="562483" y="6098546"/>
             <a:ext cx="2861684" cy="547966"/>
             <a:chOff x="342427" y="2444366"/>
             <a:chExt cx="7356573" cy="1432945"/>
@@ -4014,10 +4066,909 @@
           </p:spPr>
         </p:pic>
       </p:grpSp>
+      <p:pic>
+        <p:nvPicPr>
+          <p:cNvPr id="9" name="Grafik 8">
+            <a:extLst>
+              <a:ext uri="{FF2B5EF4-FFF2-40B4-BE49-F238E27FC236}">
+                <a16:creationId xmlns:a16="http://schemas.microsoft.com/office/drawing/2014/main" id="{BAC449BF-B20D-8B61-8A4A-A0C04C3938B9}"/>
+              </a:ext>
+            </a:extLst>
+          </p:cNvPr>
+          <p:cNvPicPr>
+            <a:picLocks noChangeAspect="1"/>
+          </p:cNvPicPr>
+          <p:nvPr/>
+        </p:nvPicPr>
+        <p:blipFill>
+          <a:blip r:embed="rId5">
+            <a:extLst>
+              <a:ext uri="{28A0092B-C50C-407E-A947-70E740481C1C}">
+                <a14:useLocalDpi xmlns:a14="http://schemas.microsoft.com/office/drawing/2010/main" val="0"/>
+              </a:ext>
+            </a:extLst>
+          </a:blip>
+          <a:stretch>
+            <a:fillRect/>
+          </a:stretch>
+        </p:blipFill>
+        <p:spPr>
+          <a:xfrm>
+            <a:off x="9054859" y="1782545"/>
+            <a:ext cx="2070013" cy="1239907"/>
+          </a:xfrm>
+          <a:prstGeom prst="rect">
+            <a:avLst/>
+          </a:prstGeom>
+        </p:spPr>
+      </p:pic>
+      <p:pic>
+        <p:nvPicPr>
+          <p:cNvPr id="12" name="Grafik 11">
+            <a:extLst>
+              <a:ext uri="{FF2B5EF4-FFF2-40B4-BE49-F238E27FC236}">
+                <a16:creationId xmlns:a16="http://schemas.microsoft.com/office/drawing/2014/main" id="{6EEC2746-98CF-74CB-E77F-F1E28A2B96E6}"/>
+              </a:ext>
+            </a:extLst>
+          </p:cNvPr>
+          <p:cNvPicPr>
+            <a:picLocks noChangeAspect="1"/>
+          </p:cNvPicPr>
+          <p:nvPr/>
+        </p:nvPicPr>
+        <p:blipFill>
+          <a:blip r:embed="rId6">
+            <a:extLst>
+              <a:ext uri="{28A0092B-C50C-407E-A947-70E740481C1C}">
+                <a14:useLocalDpi xmlns:a14="http://schemas.microsoft.com/office/drawing/2010/main" val="0"/>
+              </a:ext>
+            </a:extLst>
+          </a:blip>
+          <a:srcRect l="10885" r="4542"/>
+          <a:stretch/>
+        </p:blipFill>
+        <p:spPr>
+          <a:xfrm>
+            <a:off x="4411346" y="1709739"/>
+            <a:ext cx="4081669" cy="1604350"/>
+          </a:xfrm>
+          <a:prstGeom prst="rect">
+            <a:avLst/>
+          </a:prstGeom>
+        </p:spPr>
+      </p:pic>
     </p:spTree>
     <p:extLst>
       <p:ext uri="{BB962C8B-B14F-4D97-AF65-F5344CB8AC3E}">
         <p14:creationId xmlns:p14="http://schemas.microsoft.com/office/powerpoint/2010/main" val="2103083663"/>
+      </p:ext>
+    </p:extLst>
+  </p:cSld>
+  <p:clrMapOvr>
+    <a:masterClrMapping/>
+  </p:clrMapOvr>
+</p:sld>
+</file>
+
+<file path=ppt/slides/slide4.xml><?xml version="1.0" encoding="utf-8"?>
+<p:sld xmlns:a="http://schemas.openxmlformats.org/drawingml/2006/main" xmlns:r="http://schemas.openxmlformats.org/officeDocument/2006/relationships" xmlns:p="http://schemas.openxmlformats.org/presentationml/2006/main">
+  <p:cSld>
+    <p:spTree>
+      <p:nvGrpSpPr>
+        <p:cNvPr id="1" name="">
+          <a:extLst>
+            <a:ext uri="{FF2B5EF4-FFF2-40B4-BE49-F238E27FC236}">
+              <a16:creationId xmlns:a16="http://schemas.microsoft.com/office/drawing/2014/main" id="{E3DBB45F-5464-6CED-0DA7-413FD3E5F3A5}"/>
+            </a:ext>
+          </a:extLst>
+        </p:cNvPr>
+        <p:cNvGrpSpPr/>
+        <p:nvPr/>
+      </p:nvGrpSpPr>
+      <p:grpSpPr>
+        <a:xfrm>
+          <a:off x="0" y="0"/>
+          <a:ext cx="0" cy="0"/>
+          <a:chOff x="0" y="0"/>
+          <a:chExt cx="0" cy="0"/>
+        </a:xfrm>
+      </p:grpSpPr>
+      <p:grpSp>
+        <p:nvGrpSpPr>
+          <p:cNvPr id="3" name="Gruppieren 2">
+            <a:extLst>
+              <a:ext uri="{FF2B5EF4-FFF2-40B4-BE49-F238E27FC236}">
+                <a16:creationId xmlns:a16="http://schemas.microsoft.com/office/drawing/2014/main" id="{B737126F-F6D0-D4C5-5EE8-E01297450985}"/>
+              </a:ext>
+            </a:extLst>
+          </p:cNvPr>
+          <p:cNvGrpSpPr/>
+          <p:nvPr/>
+        </p:nvGrpSpPr>
+        <p:grpSpPr>
+          <a:xfrm>
+            <a:off x="562483" y="6098546"/>
+            <a:ext cx="2861684" cy="547966"/>
+            <a:chOff x="342427" y="2444366"/>
+            <a:chExt cx="7356573" cy="1432945"/>
+          </a:xfrm>
+        </p:grpSpPr>
+        <p:pic>
+          <p:nvPicPr>
+            <p:cNvPr id="4" name="Grafik 3" descr="Ein Bild, das Schwarz, Dunkelheit enthält.&#10;&#10;Automatisch generierte Beschreibung">
+              <a:extLst>
+                <a:ext uri="{FF2B5EF4-FFF2-40B4-BE49-F238E27FC236}">
+                  <a16:creationId xmlns:a16="http://schemas.microsoft.com/office/drawing/2014/main" id="{8C56E0EF-1772-2EB8-CFB0-B9F304A19BC2}"/>
+                </a:ext>
+              </a:extLst>
+            </p:cNvPr>
+            <p:cNvPicPr>
+              <a:picLocks noChangeAspect="1"/>
+            </p:cNvPicPr>
+            <p:nvPr/>
+          </p:nvPicPr>
+          <p:blipFill>
+            <a:blip r:embed="rId2">
+              <a:extLst>
+                <a:ext uri="{28A0092B-C50C-407E-A947-70E740481C1C}">
+                  <a14:useLocalDpi xmlns:a14="http://schemas.microsoft.com/office/drawing/2010/main" val="0"/>
+                </a:ext>
+              </a:extLst>
+            </a:blip>
+            <a:stretch>
+              <a:fillRect/>
+            </a:stretch>
+          </p:blipFill>
+          <p:spPr>
+            <a:xfrm>
+              <a:off x="4915096" y="2444366"/>
+              <a:ext cx="2783904" cy="1220969"/>
+            </a:xfrm>
+            <a:prstGeom prst="rect">
+              <a:avLst/>
+            </a:prstGeom>
+          </p:spPr>
+        </p:pic>
+        <p:pic>
+          <p:nvPicPr>
+            <p:cNvPr id="6" name="Grafik 5" descr="Ein Bild, das Text, Menschliches Gesicht, Schrift, Grafiken enthält.&#10;&#10;Automatisch generierte Beschreibung">
+              <a:extLst>
+                <a:ext uri="{FF2B5EF4-FFF2-40B4-BE49-F238E27FC236}">
+                  <a16:creationId xmlns:a16="http://schemas.microsoft.com/office/drawing/2014/main" id="{563A971E-965C-257B-3420-E181E42226CD}"/>
+                </a:ext>
+              </a:extLst>
+            </p:cNvPr>
+            <p:cNvPicPr>
+              <a:picLocks noChangeAspect="1"/>
+            </p:cNvPicPr>
+            <p:nvPr/>
+          </p:nvPicPr>
+          <p:blipFill>
+            <a:blip r:embed="rId3">
+              <a:extLst>
+                <a:ext uri="{28A0092B-C50C-407E-A947-70E740481C1C}">
+                  <a14:useLocalDpi xmlns:a14="http://schemas.microsoft.com/office/drawing/2010/main" val="0"/>
+                </a:ext>
+              </a:extLst>
+            </a:blip>
+            <a:stretch>
+              <a:fillRect/>
+            </a:stretch>
+          </p:blipFill>
+          <p:spPr>
+            <a:xfrm>
+              <a:off x="3005573" y="2492213"/>
+              <a:ext cx="1793834" cy="977566"/>
+            </a:xfrm>
+            <a:prstGeom prst="rect">
+              <a:avLst/>
+            </a:prstGeom>
+          </p:spPr>
+        </p:pic>
+        <p:pic>
+          <p:nvPicPr>
+            <p:cNvPr id="8" name="Grafik 7" descr="Ein Bild, das Text, Schrift, Screenshot, Grafiken enthält.&#10;&#10;Automatisch generierte Beschreibung">
+              <a:extLst>
+                <a:ext uri="{FF2B5EF4-FFF2-40B4-BE49-F238E27FC236}">
+                  <a16:creationId xmlns:a16="http://schemas.microsoft.com/office/drawing/2014/main" id="{2571FEA7-5DCD-1BD4-1C22-DBC4E8A1831D}"/>
+                </a:ext>
+              </a:extLst>
+            </p:cNvPr>
+            <p:cNvPicPr>
+              <a:picLocks noChangeAspect="1"/>
+            </p:cNvPicPr>
+            <p:nvPr/>
+          </p:nvPicPr>
+          <p:blipFill>
+            <a:blip r:embed="rId4">
+              <a:extLst>
+                <a:ext uri="{28A0092B-C50C-407E-A947-70E740481C1C}">
+                  <a14:useLocalDpi xmlns:a14="http://schemas.microsoft.com/office/drawing/2010/main" val="0"/>
+                </a:ext>
+              </a:extLst>
+            </a:blip>
+            <a:stretch>
+              <a:fillRect/>
+            </a:stretch>
+          </p:blipFill>
+          <p:spPr>
+            <a:xfrm>
+              <a:off x="342427" y="2444366"/>
+              <a:ext cx="2547457" cy="1432945"/>
+            </a:xfrm>
+            <a:prstGeom prst="rect">
+              <a:avLst/>
+            </a:prstGeom>
+          </p:spPr>
+        </p:pic>
+      </p:grpSp>
+      <p:grpSp>
+        <p:nvGrpSpPr>
+          <p:cNvPr id="10" name="Gruppieren 9">
+            <a:extLst>
+              <a:ext uri="{FF2B5EF4-FFF2-40B4-BE49-F238E27FC236}">
+                <a16:creationId xmlns:a16="http://schemas.microsoft.com/office/drawing/2014/main" id="{A64FF5B0-87AA-4AC2-18BA-30F1CEC9D9BA}"/>
+              </a:ext>
+            </a:extLst>
+          </p:cNvPr>
+          <p:cNvGrpSpPr/>
+          <p:nvPr/>
+        </p:nvGrpSpPr>
+        <p:grpSpPr>
+          <a:xfrm>
+            <a:off x="471370" y="556262"/>
+            <a:ext cx="11249260" cy="1061392"/>
+            <a:chOff x="664843" y="2050692"/>
+            <a:chExt cx="11249260" cy="1061392"/>
+          </a:xfrm>
+        </p:grpSpPr>
+        <p:pic>
+          <p:nvPicPr>
+            <p:cNvPr id="7" name="Grafik 6" descr="Ein Bild, das Text, Menschliches Gesicht, Schrift, Grafiken enthält.&#10;&#10;Automatisch generierte Beschreibung">
+              <a:extLst>
+                <a:ext uri="{FF2B5EF4-FFF2-40B4-BE49-F238E27FC236}">
+                  <a16:creationId xmlns:a16="http://schemas.microsoft.com/office/drawing/2014/main" id="{D41F9BA1-4382-0153-AB63-84AB4C6AC764}"/>
+                </a:ext>
+              </a:extLst>
+            </p:cNvPr>
+            <p:cNvPicPr>
+              <a:picLocks noChangeAspect="1"/>
+            </p:cNvPicPr>
+            <p:nvPr/>
+          </p:nvPicPr>
+          <p:blipFill>
+            <a:blip r:embed="rId3">
+              <a:extLst>
+                <a:ext uri="{28A0092B-C50C-407E-A947-70E740481C1C}">
+                  <a14:useLocalDpi xmlns:a14="http://schemas.microsoft.com/office/drawing/2010/main" val="0"/>
+                </a:ext>
+              </a:extLst>
+            </a:blip>
+            <a:stretch>
+              <a:fillRect/>
+            </a:stretch>
+          </p:blipFill>
+          <p:spPr>
+            <a:xfrm>
+              <a:off x="4965498" y="2050692"/>
+              <a:ext cx="1793834" cy="977566"/>
+            </a:xfrm>
+            <a:prstGeom prst="rect">
+              <a:avLst/>
+            </a:prstGeom>
+          </p:spPr>
+        </p:pic>
+        <p:grpSp>
+          <p:nvGrpSpPr>
+            <p:cNvPr id="2" name="Gruppieren 1">
+              <a:extLst>
+                <a:ext uri="{FF2B5EF4-FFF2-40B4-BE49-F238E27FC236}">
+                  <a16:creationId xmlns:a16="http://schemas.microsoft.com/office/drawing/2014/main" id="{E9FE3334-8B81-02EE-BB30-4BAF4342623C}"/>
+                </a:ext>
+              </a:extLst>
+            </p:cNvPr>
+            <p:cNvGrpSpPr/>
+            <p:nvPr/>
+          </p:nvGrpSpPr>
+          <p:grpSpPr>
+            <a:xfrm>
+              <a:off x="6793452" y="2089056"/>
+              <a:ext cx="5120651" cy="1023028"/>
+              <a:chOff x="7117543" y="2050692"/>
+              <a:chExt cx="5120651" cy="1023028"/>
+            </a:xfrm>
+          </p:grpSpPr>
+          <p:pic>
+            <p:nvPicPr>
+              <p:cNvPr id="5" name="Grafik 4" descr="Ein Bild, das Schwarz, Dunkelheit enthält.&#10;&#10;Automatisch generierte Beschreibung">
+                <a:extLst>
+                  <a:ext uri="{FF2B5EF4-FFF2-40B4-BE49-F238E27FC236}">
+                    <a16:creationId xmlns:a16="http://schemas.microsoft.com/office/drawing/2014/main" id="{19A569F5-58D5-7E21-103A-DDBBEDE73144}"/>
+                  </a:ext>
+                </a:extLst>
+              </p:cNvPr>
+              <p:cNvPicPr>
+                <a:picLocks noChangeAspect="1"/>
+              </p:cNvPicPr>
+              <p:nvPr/>
+            </p:nvPicPr>
+            <p:blipFill>
+              <a:blip r:embed="rId2">
+                <a:extLst>
+                  <a:ext uri="{28A0092B-C50C-407E-A947-70E740481C1C}">
+                    <a14:useLocalDpi xmlns:a14="http://schemas.microsoft.com/office/drawing/2010/main" val="0"/>
+                  </a:ext>
+                </a:extLst>
+              </a:blip>
+              <a:stretch>
+                <a:fillRect/>
+              </a:stretch>
+            </p:blipFill>
+            <p:spPr>
+              <a:xfrm>
+                <a:off x="10253970" y="2127084"/>
+                <a:ext cx="1984224" cy="870244"/>
+              </a:xfrm>
+              <a:prstGeom prst="rect">
+                <a:avLst/>
+              </a:prstGeom>
+            </p:spPr>
+          </p:pic>
+          <p:pic>
+            <p:nvPicPr>
+              <p:cNvPr id="11" name="Grafik 10" descr="Ein Bild, das Text, Schrift, Screenshot, Grafiken enthält.&#10;&#10;Automatisch generierte Beschreibung">
+                <a:extLst>
+                  <a:ext uri="{FF2B5EF4-FFF2-40B4-BE49-F238E27FC236}">
+                    <a16:creationId xmlns:a16="http://schemas.microsoft.com/office/drawing/2014/main" id="{50300B06-66F2-74E2-4231-44123A423B15}"/>
+                  </a:ext>
+                </a:extLst>
+              </p:cNvPr>
+              <p:cNvPicPr>
+                <a:picLocks noChangeAspect="1"/>
+              </p:cNvPicPr>
+              <p:nvPr/>
+            </p:nvPicPr>
+            <p:blipFill>
+              <a:blip r:embed="rId4">
+                <a:extLst>
+                  <a:ext uri="{28A0092B-C50C-407E-A947-70E740481C1C}">
+                    <a14:useLocalDpi xmlns:a14="http://schemas.microsoft.com/office/drawing/2010/main" val="0"/>
+                  </a:ext>
+                </a:extLst>
+              </a:blip>
+              <a:stretch>
+                <a:fillRect/>
+              </a:stretch>
+            </p:blipFill>
+            <p:spPr>
+              <a:xfrm>
+                <a:off x="8458883" y="2050692"/>
+                <a:ext cx="1818716" cy="1023028"/>
+              </a:xfrm>
+              <a:prstGeom prst="rect">
+                <a:avLst/>
+              </a:prstGeom>
+            </p:spPr>
+          </p:pic>
+          <p:pic>
+            <p:nvPicPr>
+              <p:cNvPr id="9" name="Grafik 8">
+                <a:extLst>
+                  <a:ext uri="{FF2B5EF4-FFF2-40B4-BE49-F238E27FC236}">
+                    <a16:creationId xmlns:a16="http://schemas.microsoft.com/office/drawing/2014/main" id="{B500894D-B431-E402-1050-23BF00F261CC}"/>
+                  </a:ext>
+                </a:extLst>
+              </p:cNvPr>
+              <p:cNvPicPr>
+                <a:picLocks noChangeAspect="1"/>
+              </p:cNvPicPr>
+              <p:nvPr/>
+            </p:nvPicPr>
+            <p:blipFill>
+              <a:blip r:embed="rId5">
+                <a:extLst>
+                  <a:ext uri="{28A0092B-C50C-407E-A947-70E740481C1C}">
+                    <a14:useLocalDpi xmlns:a14="http://schemas.microsoft.com/office/drawing/2010/main" val="0"/>
+                  </a:ext>
+                </a:extLst>
+              </a:blip>
+              <a:stretch>
+                <a:fillRect/>
+              </a:stretch>
+            </p:blipFill>
+            <p:spPr>
+              <a:xfrm>
+                <a:off x="7117543" y="2125741"/>
+                <a:ext cx="1457348" cy="872930"/>
+              </a:xfrm>
+              <a:prstGeom prst="rect">
+                <a:avLst/>
+              </a:prstGeom>
+            </p:spPr>
+          </p:pic>
+        </p:grpSp>
+        <p:pic>
+          <p:nvPicPr>
+            <p:cNvPr id="12" name="Grafik 11">
+              <a:extLst>
+                <a:ext uri="{FF2B5EF4-FFF2-40B4-BE49-F238E27FC236}">
+                  <a16:creationId xmlns:a16="http://schemas.microsoft.com/office/drawing/2014/main" id="{8F7C8D14-2C25-15D9-D2F4-4AD85D06801C}"/>
+                </a:ext>
+              </a:extLst>
+            </p:cNvPr>
+            <p:cNvPicPr>
+              <a:picLocks noChangeAspect="1"/>
+            </p:cNvPicPr>
+            <p:nvPr/>
+          </p:nvPicPr>
+          <p:blipFill>
+            <a:blip r:embed="rId6">
+              <a:extLst>
+                <a:ext uri="{28A0092B-C50C-407E-A947-70E740481C1C}">
+                  <a14:useLocalDpi xmlns:a14="http://schemas.microsoft.com/office/drawing/2010/main" val="0"/>
+                </a:ext>
+              </a:extLst>
+            </a:blip>
+            <a:srcRect l="10885" t="19534" r="4542" b="27848"/>
+            <a:stretch/>
+          </p:blipFill>
+          <p:spPr>
+            <a:xfrm>
+              <a:off x="664843" y="2267905"/>
+              <a:ext cx="4081669" cy="844179"/>
+            </a:xfrm>
+            <a:prstGeom prst="rect">
+              <a:avLst/>
+            </a:prstGeom>
+          </p:spPr>
+        </p:pic>
+      </p:grpSp>
+      <p:grpSp>
+        <p:nvGrpSpPr>
+          <p:cNvPr id="13" name="Gruppieren 12">
+            <a:extLst>
+              <a:ext uri="{FF2B5EF4-FFF2-40B4-BE49-F238E27FC236}">
+                <a16:creationId xmlns:a16="http://schemas.microsoft.com/office/drawing/2014/main" id="{E7BAC504-C48A-72DF-0126-C9E4E7D85DB4}"/>
+              </a:ext>
+            </a:extLst>
+          </p:cNvPr>
+          <p:cNvGrpSpPr/>
+          <p:nvPr/>
+        </p:nvGrpSpPr>
+        <p:grpSpPr>
+          <a:xfrm>
+            <a:off x="471370" y="2451434"/>
+            <a:ext cx="11140076" cy="1072372"/>
+            <a:chOff x="664843" y="2046551"/>
+            <a:chExt cx="11140076" cy="1072372"/>
+          </a:xfrm>
+        </p:grpSpPr>
+        <p:pic>
+          <p:nvPicPr>
+            <p:cNvPr id="14" name="Grafik 13" descr="Ein Bild, das Text, Menschliches Gesicht, Schrift, Grafiken enthält.&#10;&#10;Automatisch generierte Beschreibung">
+              <a:extLst>
+                <a:ext uri="{FF2B5EF4-FFF2-40B4-BE49-F238E27FC236}">
+                  <a16:creationId xmlns:a16="http://schemas.microsoft.com/office/drawing/2014/main" id="{2A27A97A-3D0D-6E53-E3E0-4859A77C878C}"/>
+                </a:ext>
+              </a:extLst>
+            </p:cNvPr>
+            <p:cNvPicPr>
+              <a:picLocks noChangeAspect="1"/>
+            </p:cNvPicPr>
+            <p:nvPr/>
+          </p:nvPicPr>
+          <p:blipFill>
+            <a:blip r:embed="rId3">
+              <a:extLst>
+                <a:ext uri="{28A0092B-C50C-407E-A947-70E740481C1C}">
+                  <a14:useLocalDpi xmlns:a14="http://schemas.microsoft.com/office/drawing/2010/main" val="0"/>
+                </a:ext>
+              </a:extLst>
+            </a:blip>
+            <a:stretch>
+              <a:fillRect/>
+            </a:stretch>
+          </p:blipFill>
+          <p:spPr>
+            <a:xfrm>
+              <a:off x="6208960" y="2046551"/>
+              <a:ext cx="1793834" cy="977566"/>
+            </a:xfrm>
+            <a:prstGeom prst="rect">
+              <a:avLst/>
+            </a:prstGeom>
+          </p:spPr>
+        </p:pic>
+        <p:grpSp>
+          <p:nvGrpSpPr>
+            <p:cNvPr id="15" name="Gruppieren 14">
+              <a:extLst>
+                <a:ext uri="{FF2B5EF4-FFF2-40B4-BE49-F238E27FC236}">
+                  <a16:creationId xmlns:a16="http://schemas.microsoft.com/office/drawing/2014/main" id="{AE0DD38B-7774-6FA8-A105-696CF699B71A}"/>
+                </a:ext>
+              </a:extLst>
+            </p:cNvPr>
+            <p:cNvGrpSpPr/>
+            <p:nvPr/>
+          </p:nvGrpSpPr>
+          <p:grpSpPr>
+            <a:xfrm>
+              <a:off x="4678043" y="2089056"/>
+              <a:ext cx="7126876" cy="1029867"/>
+              <a:chOff x="5002134" y="2050692"/>
+              <a:chExt cx="7126876" cy="1029867"/>
+            </a:xfrm>
+          </p:grpSpPr>
+          <p:pic>
+            <p:nvPicPr>
+              <p:cNvPr id="17" name="Grafik 16" descr="Ein Bild, das Schwarz, Dunkelheit enthält.&#10;&#10;Automatisch generierte Beschreibung">
+                <a:extLst>
+                  <a:ext uri="{FF2B5EF4-FFF2-40B4-BE49-F238E27FC236}">
+                    <a16:creationId xmlns:a16="http://schemas.microsoft.com/office/drawing/2014/main" id="{55F5CB0C-5ADC-BE7F-76F4-D12938AB8DA3}"/>
+                  </a:ext>
+                </a:extLst>
+              </p:cNvPr>
+              <p:cNvPicPr>
+                <a:picLocks noChangeAspect="1"/>
+              </p:cNvPicPr>
+              <p:nvPr/>
+            </p:nvPicPr>
+            <p:blipFill>
+              <a:blip r:embed="rId2">
+                <a:extLst>
+                  <a:ext uri="{28A0092B-C50C-407E-A947-70E740481C1C}">
+                    <a14:useLocalDpi xmlns:a14="http://schemas.microsoft.com/office/drawing/2010/main" val="0"/>
+                  </a:ext>
+                </a:extLst>
+              </a:blip>
+              <a:stretch>
+                <a:fillRect/>
+              </a:stretch>
+            </p:blipFill>
+            <p:spPr>
+              <a:xfrm>
+                <a:off x="10144786" y="2113436"/>
+                <a:ext cx="1984224" cy="870244"/>
+              </a:xfrm>
+              <a:prstGeom prst="rect">
+                <a:avLst/>
+              </a:prstGeom>
+            </p:spPr>
+          </p:pic>
+          <p:pic>
+            <p:nvPicPr>
+              <p:cNvPr id="18" name="Grafik 17" descr="Ein Bild, das Text, Schrift, Screenshot, Grafiken enthält.&#10;&#10;Automatisch generierte Beschreibung">
+                <a:extLst>
+                  <a:ext uri="{FF2B5EF4-FFF2-40B4-BE49-F238E27FC236}">
+                    <a16:creationId xmlns:a16="http://schemas.microsoft.com/office/drawing/2014/main" id="{AD66D204-BBD0-6A0E-C6B1-A3CF3CEB81E6}"/>
+                  </a:ext>
+                </a:extLst>
+              </p:cNvPr>
+              <p:cNvPicPr>
+                <a:picLocks noChangeAspect="1"/>
+              </p:cNvPicPr>
+              <p:nvPr/>
+            </p:nvPicPr>
+            <p:blipFill>
+              <a:blip r:embed="rId4">
+                <a:extLst>
+                  <a:ext uri="{28A0092B-C50C-407E-A947-70E740481C1C}">
+                    <a14:useLocalDpi xmlns:a14="http://schemas.microsoft.com/office/drawing/2010/main" val="0"/>
+                  </a:ext>
+                </a:extLst>
+              </a:blip>
+              <a:stretch>
+                <a:fillRect/>
+              </a:stretch>
+            </p:blipFill>
+            <p:spPr>
+              <a:xfrm>
+                <a:off x="8390643" y="2050692"/>
+                <a:ext cx="1818716" cy="1023028"/>
+              </a:xfrm>
+              <a:prstGeom prst="rect">
+                <a:avLst/>
+              </a:prstGeom>
+            </p:spPr>
+          </p:pic>
+          <p:pic>
+            <p:nvPicPr>
+              <p:cNvPr id="19" name="Grafik 18">
+                <a:extLst>
+                  <a:ext uri="{FF2B5EF4-FFF2-40B4-BE49-F238E27FC236}">
+                    <a16:creationId xmlns:a16="http://schemas.microsoft.com/office/drawing/2014/main" id="{EAA60592-4A0A-103B-9756-F70CFFF13321}"/>
+                  </a:ext>
+                </a:extLst>
+              </p:cNvPr>
+              <p:cNvPicPr>
+                <a:picLocks noChangeAspect="1"/>
+              </p:cNvPicPr>
+              <p:nvPr/>
+            </p:nvPicPr>
+            <p:blipFill>
+              <a:blip r:embed="rId5">
+                <a:extLst>
+                  <a:ext uri="{28A0092B-C50C-407E-A947-70E740481C1C}">
+                    <a14:useLocalDpi xmlns:a14="http://schemas.microsoft.com/office/drawing/2010/main" val="0"/>
+                  </a:ext>
+                </a:extLst>
+              </a:blip>
+              <a:stretch>
+                <a:fillRect/>
+              </a:stretch>
+            </p:blipFill>
+            <p:spPr>
+              <a:xfrm>
+                <a:off x="5002134" y="2207629"/>
+                <a:ext cx="1457348" cy="872930"/>
+              </a:xfrm>
+              <a:prstGeom prst="rect">
+                <a:avLst/>
+              </a:prstGeom>
+            </p:spPr>
+          </p:pic>
+        </p:grpSp>
+        <p:pic>
+          <p:nvPicPr>
+            <p:cNvPr id="16" name="Grafik 15">
+              <a:extLst>
+                <a:ext uri="{FF2B5EF4-FFF2-40B4-BE49-F238E27FC236}">
+                  <a16:creationId xmlns:a16="http://schemas.microsoft.com/office/drawing/2014/main" id="{25A7CDE5-25BF-4DC3-D99B-18EC234846A0}"/>
+                </a:ext>
+              </a:extLst>
+            </p:cNvPr>
+            <p:cNvPicPr>
+              <a:picLocks noChangeAspect="1"/>
+            </p:cNvPicPr>
+            <p:nvPr/>
+          </p:nvPicPr>
+          <p:blipFill>
+            <a:blip r:embed="rId6">
+              <a:extLst>
+                <a:ext uri="{28A0092B-C50C-407E-A947-70E740481C1C}">
+                  <a14:useLocalDpi xmlns:a14="http://schemas.microsoft.com/office/drawing/2010/main" val="0"/>
+                </a:ext>
+              </a:extLst>
+            </a:blip>
+            <a:srcRect l="10885" t="19534" r="4542" b="27848"/>
+            <a:stretch/>
+          </p:blipFill>
+          <p:spPr>
+            <a:xfrm>
+              <a:off x="664843" y="2267905"/>
+              <a:ext cx="4081669" cy="844179"/>
+            </a:xfrm>
+            <a:prstGeom prst="rect">
+              <a:avLst/>
+            </a:prstGeom>
+          </p:spPr>
+        </p:pic>
+      </p:grpSp>
+      <p:grpSp>
+        <p:nvGrpSpPr>
+          <p:cNvPr id="20" name="Gruppieren 19">
+            <a:extLst>
+              <a:ext uri="{FF2B5EF4-FFF2-40B4-BE49-F238E27FC236}">
+                <a16:creationId xmlns:a16="http://schemas.microsoft.com/office/drawing/2014/main" id="{8C7D1298-7689-20BB-8076-038EDF877D2F}"/>
+              </a:ext>
+            </a:extLst>
+          </p:cNvPr>
+          <p:cNvGrpSpPr/>
+          <p:nvPr/>
+        </p:nvGrpSpPr>
+        <p:grpSpPr>
+          <a:xfrm>
+            <a:off x="1947337" y="4532189"/>
+            <a:ext cx="8491216" cy="817386"/>
+            <a:chOff x="664843" y="2046551"/>
+            <a:chExt cx="11140076" cy="1072372"/>
+          </a:xfrm>
+        </p:grpSpPr>
+        <p:pic>
+          <p:nvPicPr>
+            <p:cNvPr id="21" name="Grafik 20" descr="Ein Bild, das Text, Menschliches Gesicht, Schrift, Grafiken enthält.&#10;&#10;Automatisch generierte Beschreibung">
+              <a:extLst>
+                <a:ext uri="{FF2B5EF4-FFF2-40B4-BE49-F238E27FC236}">
+                  <a16:creationId xmlns:a16="http://schemas.microsoft.com/office/drawing/2014/main" id="{1C1FD3A1-DA4E-D9EB-53AE-6A10B39F727F}"/>
+                </a:ext>
+              </a:extLst>
+            </p:cNvPr>
+            <p:cNvPicPr>
+              <a:picLocks noChangeAspect="1"/>
+            </p:cNvPicPr>
+            <p:nvPr/>
+          </p:nvPicPr>
+          <p:blipFill>
+            <a:blip r:embed="rId3">
+              <a:extLst>
+                <a:ext uri="{28A0092B-C50C-407E-A947-70E740481C1C}">
+                  <a14:useLocalDpi xmlns:a14="http://schemas.microsoft.com/office/drawing/2010/main" val="0"/>
+                </a:ext>
+              </a:extLst>
+            </a:blip>
+            <a:stretch>
+              <a:fillRect/>
+            </a:stretch>
+          </p:blipFill>
+          <p:spPr>
+            <a:xfrm>
+              <a:off x="6208960" y="2046551"/>
+              <a:ext cx="1793834" cy="977566"/>
+            </a:xfrm>
+            <a:prstGeom prst="rect">
+              <a:avLst/>
+            </a:prstGeom>
+          </p:spPr>
+        </p:pic>
+        <p:grpSp>
+          <p:nvGrpSpPr>
+            <p:cNvPr id="22" name="Gruppieren 21">
+              <a:extLst>
+                <a:ext uri="{FF2B5EF4-FFF2-40B4-BE49-F238E27FC236}">
+                  <a16:creationId xmlns:a16="http://schemas.microsoft.com/office/drawing/2014/main" id="{6997DFEB-652D-B934-B872-17A7C563DE0F}"/>
+                </a:ext>
+              </a:extLst>
+            </p:cNvPr>
+            <p:cNvGrpSpPr/>
+            <p:nvPr/>
+          </p:nvGrpSpPr>
+          <p:grpSpPr>
+            <a:xfrm>
+              <a:off x="4678043" y="2089056"/>
+              <a:ext cx="7126876" cy="1029867"/>
+              <a:chOff x="5002134" y="2050692"/>
+              <a:chExt cx="7126876" cy="1029867"/>
+            </a:xfrm>
+          </p:grpSpPr>
+          <p:pic>
+            <p:nvPicPr>
+              <p:cNvPr id="24" name="Grafik 23" descr="Ein Bild, das Schwarz, Dunkelheit enthält.&#10;&#10;Automatisch generierte Beschreibung">
+                <a:extLst>
+                  <a:ext uri="{FF2B5EF4-FFF2-40B4-BE49-F238E27FC236}">
+                    <a16:creationId xmlns:a16="http://schemas.microsoft.com/office/drawing/2014/main" id="{E97EDD42-4A19-3064-A58E-9068084F3559}"/>
+                  </a:ext>
+                </a:extLst>
+              </p:cNvPr>
+              <p:cNvPicPr>
+                <a:picLocks noChangeAspect="1"/>
+              </p:cNvPicPr>
+              <p:nvPr/>
+            </p:nvPicPr>
+            <p:blipFill>
+              <a:blip r:embed="rId2">
+                <a:extLst>
+                  <a:ext uri="{28A0092B-C50C-407E-A947-70E740481C1C}">
+                    <a14:useLocalDpi xmlns:a14="http://schemas.microsoft.com/office/drawing/2010/main" val="0"/>
+                  </a:ext>
+                </a:extLst>
+              </a:blip>
+              <a:stretch>
+                <a:fillRect/>
+              </a:stretch>
+            </p:blipFill>
+            <p:spPr>
+              <a:xfrm>
+                <a:off x="10144786" y="2113436"/>
+                <a:ext cx="1984224" cy="870244"/>
+              </a:xfrm>
+              <a:prstGeom prst="rect">
+                <a:avLst/>
+              </a:prstGeom>
+            </p:spPr>
+          </p:pic>
+          <p:pic>
+            <p:nvPicPr>
+              <p:cNvPr id="25" name="Grafik 24" descr="Ein Bild, das Text, Schrift, Screenshot, Grafiken enthält.&#10;&#10;Automatisch generierte Beschreibung">
+                <a:extLst>
+                  <a:ext uri="{FF2B5EF4-FFF2-40B4-BE49-F238E27FC236}">
+                    <a16:creationId xmlns:a16="http://schemas.microsoft.com/office/drawing/2014/main" id="{95F3169C-176F-1428-F963-CBCE4932473F}"/>
+                  </a:ext>
+                </a:extLst>
+              </p:cNvPr>
+              <p:cNvPicPr>
+                <a:picLocks noChangeAspect="1"/>
+              </p:cNvPicPr>
+              <p:nvPr/>
+            </p:nvPicPr>
+            <p:blipFill>
+              <a:blip r:embed="rId4">
+                <a:extLst>
+                  <a:ext uri="{28A0092B-C50C-407E-A947-70E740481C1C}">
+                    <a14:useLocalDpi xmlns:a14="http://schemas.microsoft.com/office/drawing/2010/main" val="0"/>
+                  </a:ext>
+                </a:extLst>
+              </a:blip>
+              <a:stretch>
+                <a:fillRect/>
+              </a:stretch>
+            </p:blipFill>
+            <p:spPr>
+              <a:xfrm>
+                <a:off x="8390643" y="2050692"/>
+                <a:ext cx="1818716" cy="1023028"/>
+              </a:xfrm>
+              <a:prstGeom prst="rect">
+                <a:avLst/>
+              </a:prstGeom>
+            </p:spPr>
+          </p:pic>
+          <p:pic>
+            <p:nvPicPr>
+              <p:cNvPr id="26" name="Grafik 25">
+                <a:extLst>
+                  <a:ext uri="{FF2B5EF4-FFF2-40B4-BE49-F238E27FC236}">
+                    <a16:creationId xmlns:a16="http://schemas.microsoft.com/office/drawing/2014/main" id="{0BE6E3C6-E9CD-102B-DE5A-39BD5BE381BD}"/>
+                  </a:ext>
+                </a:extLst>
+              </p:cNvPr>
+              <p:cNvPicPr>
+                <a:picLocks noChangeAspect="1"/>
+              </p:cNvPicPr>
+              <p:nvPr/>
+            </p:nvPicPr>
+            <p:blipFill>
+              <a:blip r:embed="rId5">
+                <a:extLst>
+                  <a:ext uri="{28A0092B-C50C-407E-A947-70E740481C1C}">
+                    <a14:useLocalDpi xmlns:a14="http://schemas.microsoft.com/office/drawing/2010/main" val="0"/>
+                  </a:ext>
+                </a:extLst>
+              </a:blip>
+              <a:stretch>
+                <a:fillRect/>
+              </a:stretch>
+            </p:blipFill>
+            <p:spPr>
+              <a:xfrm>
+                <a:off x="5002134" y="2207629"/>
+                <a:ext cx="1457348" cy="872930"/>
+              </a:xfrm>
+              <a:prstGeom prst="rect">
+                <a:avLst/>
+              </a:prstGeom>
+            </p:spPr>
+          </p:pic>
+        </p:grpSp>
+        <p:pic>
+          <p:nvPicPr>
+            <p:cNvPr id="23" name="Grafik 22">
+              <a:extLst>
+                <a:ext uri="{FF2B5EF4-FFF2-40B4-BE49-F238E27FC236}">
+                  <a16:creationId xmlns:a16="http://schemas.microsoft.com/office/drawing/2014/main" id="{C8E51BBD-7B64-AB44-93BF-D0DDB6FF662A}"/>
+                </a:ext>
+              </a:extLst>
+            </p:cNvPr>
+            <p:cNvPicPr>
+              <a:picLocks noChangeAspect="1"/>
+            </p:cNvPicPr>
+            <p:nvPr/>
+          </p:nvPicPr>
+          <p:blipFill>
+            <a:blip r:embed="rId6">
+              <a:extLst>
+                <a:ext uri="{28A0092B-C50C-407E-A947-70E740481C1C}">
+                  <a14:useLocalDpi xmlns:a14="http://schemas.microsoft.com/office/drawing/2010/main" val="0"/>
+                </a:ext>
+              </a:extLst>
+            </a:blip>
+            <a:srcRect l="10885" t="19534" r="4542" b="27848"/>
+            <a:stretch/>
+          </p:blipFill>
+          <p:spPr>
+            <a:xfrm>
+              <a:off x="664843" y="2267905"/>
+              <a:ext cx="4081669" cy="844179"/>
+            </a:xfrm>
+            <a:prstGeom prst="rect">
+              <a:avLst/>
+            </a:prstGeom>
+          </p:spPr>
+        </p:pic>
+      </p:grpSp>
+    </p:spTree>
+    <p:extLst>
+      <p:ext uri="{BB962C8B-B14F-4D97-AF65-F5344CB8AC3E}">
+        <p14:creationId xmlns:p14="http://schemas.microsoft.com/office/powerpoint/2010/main" val="2313134267"/>
       </p:ext>
     </p:extLst>
   </p:cSld>

</xml_diff>